<commit_message>
Added more presentation image edits
</commit_message>
<xml_diff>
--- a/Presentation/PresentationImage.pptx
+++ b/Presentation/PresentationImage.pptx
@@ -104,6 +104,11 @@
       </a:defRPr>
     </a:lvl9pPr>
   </p:defaultTextStyle>
+  <p:extLst>
+    <p:ext uri="{EFAFB233-063F-42B5-8137-9DF3F51BA10A}">
+      <p15:sldGuideLst xmlns:p15="http://schemas.microsoft.com/office/powerpoint/2012/main"/>
+    </p:ext>
+  </p:extLst>
 </p:presentation>
 </file>
 
@@ -1154,6 +1159,13 @@
         </dgm:presLayoutVars>
       </dgm:prSet>
       <dgm:spPr/>
+      <dgm:t>
+        <a:bodyPr/>
+        <a:lstStyle/>
+        <a:p>
+          <a:endParaRPr lang="en-US"/>
+        </a:p>
+      </dgm:t>
     </dgm:pt>
     <dgm:pt modelId="{D4923FF6-6C56-6D4D-8872-C2ECD422D5AD}" type="pres">
       <dgm:prSet presAssocID="{483FB463-73C5-0748-81E5-F17B8F8CCAF4}" presName="node" presStyleLbl="node1" presStyleIdx="0" presStyleCnt="5" custLinFactNeighborX="4215" custLinFactNeighborY="1922">
@@ -1173,10 +1185,24 @@
     <dgm:pt modelId="{D4DDD540-ED48-5942-AA78-D01D2ECBD96B}" type="pres">
       <dgm:prSet presAssocID="{155BAB72-91A2-B24F-ABA5-BBAFDE810DCA}" presName="sibTrans" presStyleLbl="sibTrans2D1" presStyleIdx="0" presStyleCnt="4"/>
       <dgm:spPr/>
+      <dgm:t>
+        <a:bodyPr/>
+        <a:lstStyle/>
+        <a:p>
+          <a:endParaRPr lang="en-US"/>
+        </a:p>
+      </dgm:t>
     </dgm:pt>
     <dgm:pt modelId="{F61B26C2-BF9F-4C47-8753-E78FA6B4E8D2}" type="pres">
       <dgm:prSet presAssocID="{155BAB72-91A2-B24F-ABA5-BBAFDE810DCA}" presName="connectorText" presStyleLbl="sibTrans2D1" presStyleIdx="0" presStyleCnt="4"/>
       <dgm:spPr/>
+      <dgm:t>
+        <a:bodyPr/>
+        <a:lstStyle/>
+        <a:p>
+          <a:endParaRPr lang="en-US"/>
+        </a:p>
+      </dgm:t>
     </dgm:pt>
     <dgm:pt modelId="{B8A9E1DD-42F9-8A4E-BB27-9F6E19AEE73D}" type="pres">
       <dgm:prSet presAssocID="{861B8FD1-DECA-1E48-8FC2-4510D62D5AF5}" presName="node" presStyleLbl="node1" presStyleIdx="1" presStyleCnt="5">
@@ -1185,14 +1211,35 @@
         </dgm:presLayoutVars>
       </dgm:prSet>
       <dgm:spPr/>
+      <dgm:t>
+        <a:bodyPr/>
+        <a:lstStyle/>
+        <a:p>
+          <a:endParaRPr lang="en-US"/>
+        </a:p>
+      </dgm:t>
     </dgm:pt>
     <dgm:pt modelId="{0FB689FA-F4EF-C54A-8D17-15AC9E2DA91E}" type="pres">
       <dgm:prSet presAssocID="{794EC41E-1CFC-AA4A-95F9-F0577CD5B8DF}" presName="sibTrans" presStyleLbl="sibTrans2D1" presStyleIdx="1" presStyleCnt="4"/>
       <dgm:spPr/>
+      <dgm:t>
+        <a:bodyPr/>
+        <a:lstStyle/>
+        <a:p>
+          <a:endParaRPr lang="en-US"/>
+        </a:p>
+      </dgm:t>
     </dgm:pt>
     <dgm:pt modelId="{2A7DFE14-643A-6F42-9471-C7E2C5C3D0F2}" type="pres">
       <dgm:prSet presAssocID="{794EC41E-1CFC-AA4A-95F9-F0577CD5B8DF}" presName="connectorText" presStyleLbl="sibTrans2D1" presStyleIdx="1" presStyleCnt="4"/>
       <dgm:spPr/>
+      <dgm:t>
+        <a:bodyPr/>
+        <a:lstStyle/>
+        <a:p>
+          <a:endParaRPr lang="en-US"/>
+        </a:p>
+      </dgm:t>
     </dgm:pt>
     <dgm:pt modelId="{B932EA59-50DD-424A-8986-12F79C4627C0}" type="pres">
       <dgm:prSet presAssocID="{CBD7F8D0-01A1-9642-914C-3A9E699DD309}" presName="node" presStyleLbl="node1" presStyleIdx="2" presStyleCnt="5">
@@ -1201,14 +1248,35 @@
         </dgm:presLayoutVars>
       </dgm:prSet>
       <dgm:spPr/>
+      <dgm:t>
+        <a:bodyPr/>
+        <a:lstStyle/>
+        <a:p>
+          <a:endParaRPr lang="en-US"/>
+        </a:p>
+      </dgm:t>
     </dgm:pt>
     <dgm:pt modelId="{02169A15-8F44-0F4E-8E62-3B6BA9F6FF93}" type="pres">
       <dgm:prSet presAssocID="{21AFD040-B0C9-D74E-AA77-F578510CD899}" presName="sibTrans" presStyleLbl="sibTrans2D1" presStyleIdx="2" presStyleCnt="4"/>
       <dgm:spPr/>
+      <dgm:t>
+        <a:bodyPr/>
+        <a:lstStyle/>
+        <a:p>
+          <a:endParaRPr lang="en-US"/>
+        </a:p>
+      </dgm:t>
     </dgm:pt>
     <dgm:pt modelId="{6510D54C-8403-AC47-B183-03EA583C71F8}" type="pres">
       <dgm:prSet presAssocID="{21AFD040-B0C9-D74E-AA77-F578510CD899}" presName="connectorText" presStyleLbl="sibTrans2D1" presStyleIdx="2" presStyleCnt="4"/>
       <dgm:spPr/>
+      <dgm:t>
+        <a:bodyPr/>
+        <a:lstStyle/>
+        <a:p>
+          <a:endParaRPr lang="en-US"/>
+        </a:p>
+      </dgm:t>
     </dgm:pt>
     <dgm:pt modelId="{3BB0D14B-FB17-154E-B5AA-919242122069}" type="pres">
       <dgm:prSet presAssocID="{8AE3F35F-6329-CB4C-B927-14C263065096}" presName="node" presStyleLbl="node1" presStyleIdx="3" presStyleCnt="5">
@@ -1217,14 +1285,35 @@
         </dgm:presLayoutVars>
       </dgm:prSet>
       <dgm:spPr/>
+      <dgm:t>
+        <a:bodyPr/>
+        <a:lstStyle/>
+        <a:p>
+          <a:endParaRPr lang="en-US"/>
+        </a:p>
+      </dgm:t>
     </dgm:pt>
     <dgm:pt modelId="{5DE5AF06-CFFA-5444-BBE1-7ADED392C508}" type="pres">
       <dgm:prSet presAssocID="{A9A8AC24-369C-F44C-904B-77A0335B6680}" presName="sibTrans" presStyleLbl="sibTrans2D1" presStyleIdx="3" presStyleCnt="4"/>
       <dgm:spPr/>
+      <dgm:t>
+        <a:bodyPr/>
+        <a:lstStyle/>
+        <a:p>
+          <a:endParaRPr lang="en-US"/>
+        </a:p>
+      </dgm:t>
     </dgm:pt>
     <dgm:pt modelId="{2B589046-0A76-D74A-B067-525EA113905D}" type="pres">
       <dgm:prSet presAssocID="{A9A8AC24-369C-F44C-904B-77A0335B6680}" presName="connectorText" presStyleLbl="sibTrans2D1" presStyleIdx="3" presStyleCnt="4"/>
       <dgm:spPr/>
+      <dgm:t>
+        <a:bodyPr/>
+        <a:lstStyle/>
+        <a:p>
+          <a:endParaRPr lang="en-US"/>
+        </a:p>
+      </dgm:t>
     </dgm:pt>
     <dgm:pt modelId="{C3B2989C-25A0-8D46-BB48-A3FD6DF58F00}" type="pres">
       <dgm:prSet presAssocID="{2E6B767F-3AAD-6A48-9738-0F8563A80CF1}" presName="node" presStyleLbl="node1" presStyleIdx="4" presStyleCnt="5">
@@ -1233,28 +1322,35 @@
         </dgm:presLayoutVars>
       </dgm:prSet>
       <dgm:spPr/>
+      <dgm:t>
+        <a:bodyPr/>
+        <a:lstStyle/>
+        <a:p>
+          <a:endParaRPr lang="en-US"/>
+        </a:p>
+      </dgm:t>
     </dgm:pt>
   </dgm:ptLst>
   <dgm:cxnLst>
-    <dgm:cxn modelId="{367A6384-BB68-6041-BCFD-1210A0F43B1F}" type="presOf" srcId="{21AFD040-B0C9-D74E-AA77-F578510CD899}" destId="{6510D54C-8403-AC47-B183-03EA583C71F8}" srcOrd="1" destOrd="0" presId="urn:microsoft.com/office/officeart/2005/8/layout/process1"/>
+    <dgm:cxn modelId="{AA5F4730-2A27-BD4E-9A6F-9A356B11A8D7}" srcId="{C18830F0-300D-5A4E-9133-47129AC70423}" destId="{2E6B767F-3AAD-6A48-9738-0F8563A80CF1}" srcOrd="4" destOrd="0" parTransId="{272E3249-1E6F-F14A-A93A-B99C62A3424F}" sibTransId="{0C2BE505-C5FD-E646-BB0B-BAAACC080997}"/>
     <dgm:cxn modelId="{57E4B1E4-005E-A84D-9B90-1C1349D39920}" srcId="{C18830F0-300D-5A4E-9133-47129AC70423}" destId="{861B8FD1-DECA-1E48-8FC2-4510D62D5AF5}" srcOrd="1" destOrd="0" parTransId="{76B1938D-08EF-394E-84FF-B6D069B9FE68}" sibTransId="{794EC41E-1CFC-AA4A-95F9-F0577CD5B8DF}"/>
+    <dgm:cxn modelId="{7B0777A9-4DEA-B54B-8FBA-4AD17DE174D7}" srcId="{C18830F0-300D-5A4E-9133-47129AC70423}" destId="{483FB463-73C5-0748-81E5-F17B8F8CCAF4}" srcOrd="0" destOrd="0" parTransId="{CF7010B8-3A41-6648-9ACA-D0E074D8D5E9}" sibTransId="{155BAB72-91A2-B24F-ABA5-BBAFDE810DCA}"/>
+    <dgm:cxn modelId="{5E1CB6C4-FD00-304C-BEB3-4F403C3B1A6F}" type="presOf" srcId="{21AFD040-B0C9-D74E-AA77-F578510CD899}" destId="{02169A15-8F44-0F4E-8E62-3B6BA9F6FF93}" srcOrd="0" destOrd="0" presId="urn:microsoft.com/office/officeart/2005/8/layout/process1"/>
+    <dgm:cxn modelId="{EB2F8D07-F41F-254A-B0F9-83EB3AF70566}" type="presOf" srcId="{A9A8AC24-369C-F44C-904B-77A0335B6680}" destId="{2B589046-0A76-D74A-B067-525EA113905D}" srcOrd="1" destOrd="0" presId="urn:microsoft.com/office/officeart/2005/8/layout/process1"/>
+    <dgm:cxn modelId="{CEA86EAF-3496-2645-91BD-21E9CE063C67}" type="presOf" srcId="{A9A8AC24-369C-F44C-904B-77A0335B6680}" destId="{5DE5AF06-CFFA-5444-BBE1-7ADED392C508}" srcOrd="0" destOrd="0" presId="urn:microsoft.com/office/officeart/2005/8/layout/process1"/>
+    <dgm:cxn modelId="{B66A0DA7-0DD1-D944-9226-3206BCC6A149}" srcId="{C18830F0-300D-5A4E-9133-47129AC70423}" destId="{CBD7F8D0-01A1-9642-914C-3A9E699DD309}" srcOrd="2" destOrd="0" parTransId="{A0668E79-8F50-BD4C-819C-4B9A4951AFFC}" sibTransId="{21AFD040-B0C9-D74E-AA77-F578510CD899}"/>
     <dgm:cxn modelId="{F19F9ECA-E33B-234E-8339-DBF47E9C8E3A}" type="presOf" srcId="{8AE3F35F-6329-CB4C-B927-14C263065096}" destId="{3BB0D14B-FB17-154E-B5AA-919242122069}" srcOrd="0" destOrd="0" presId="urn:microsoft.com/office/officeart/2005/8/layout/process1"/>
-    <dgm:cxn modelId="{7B0777A9-4DEA-B54B-8FBA-4AD17DE174D7}" srcId="{C18830F0-300D-5A4E-9133-47129AC70423}" destId="{483FB463-73C5-0748-81E5-F17B8F8CCAF4}" srcOrd="0" destOrd="0" parTransId="{CF7010B8-3A41-6648-9ACA-D0E074D8D5E9}" sibTransId="{155BAB72-91A2-B24F-ABA5-BBAFDE810DCA}"/>
-    <dgm:cxn modelId="{0B863C5A-1079-254B-9F58-D0475CD7B82C}" type="presOf" srcId="{483FB463-73C5-0748-81E5-F17B8F8CCAF4}" destId="{D4923FF6-6C56-6D4D-8872-C2ECD422D5AD}" srcOrd="0" destOrd="0" presId="urn:microsoft.com/office/officeart/2005/8/layout/process1"/>
-    <dgm:cxn modelId="{B66A0DA7-0DD1-D944-9226-3206BCC6A149}" srcId="{C18830F0-300D-5A4E-9133-47129AC70423}" destId="{CBD7F8D0-01A1-9642-914C-3A9E699DD309}" srcOrd="2" destOrd="0" parTransId="{A0668E79-8F50-BD4C-819C-4B9A4951AFFC}" sibTransId="{21AFD040-B0C9-D74E-AA77-F578510CD899}"/>
+    <dgm:cxn modelId="{FEB9A55B-FAC7-9B42-B99D-615155408B39}" type="presOf" srcId="{861B8FD1-DECA-1E48-8FC2-4510D62D5AF5}" destId="{B8A9E1DD-42F9-8A4E-BB27-9F6E19AEE73D}" srcOrd="0" destOrd="0" presId="urn:microsoft.com/office/officeart/2005/8/layout/process1"/>
+    <dgm:cxn modelId="{0135EEF6-C630-FB4F-9F0F-D581E47D0236}" type="presOf" srcId="{CBD7F8D0-01A1-9642-914C-3A9E699DD309}" destId="{B932EA59-50DD-424A-8986-12F79C4627C0}" srcOrd="0" destOrd="0" presId="urn:microsoft.com/office/officeart/2005/8/layout/process1"/>
     <dgm:cxn modelId="{90022CDA-8B0F-004B-B0C0-0EEA9B6FAF90}" type="presOf" srcId="{2E6B767F-3AAD-6A48-9738-0F8563A80CF1}" destId="{C3B2989C-25A0-8D46-BB48-A3FD6DF58F00}" srcOrd="0" destOrd="0" presId="urn:microsoft.com/office/officeart/2005/8/layout/process1"/>
-    <dgm:cxn modelId="{EB2F8D07-F41F-254A-B0F9-83EB3AF70566}" type="presOf" srcId="{A9A8AC24-369C-F44C-904B-77A0335B6680}" destId="{2B589046-0A76-D74A-B067-525EA113905D}" srcOrd="1" destOrd="0" presId="urn:microsoft.com/office/officeart/2005/8/layout/process1"/>
-    <dgm:cxn modelId="{AE807857-4629-7D43-A092-351D6EF90E88}" type="presOf" srcId="{155BAB72-91A2-B24F-ABA5-BBAFDE810DCA}" destId="{F61B26C2-BF9F-4C47-8753-E78FA6B4E8D2}" srcOrd="1" destOrd="0" presId="urn:microsoft.com/office/officeart/2005/8/layout/process1"/>
-    <dgm:cxn modelId="{CEA86EAF-3496-2645-91BD-21E9CE063C67}" type="presOf" srcId="{A9A8AC24-369C-F44C-904B-77A0335B6680}" destId="{5DE5AF06-CFFA-5444-BBE1-7ADED392C508}" srcOrd="0" destOrd="0" presId="urn:microsoft.com/office/officeart/2005/8/layout/process1"/>
     <dgm:cxn modelId="{21197FB4-8936-4147-9490-4F5FBC2912CA}" type="presOf" srcId="{C18830F0-300D-5A4E-9133-47129AC70423}" destId="{9A1A1469-D0F9-B54A-BBF4-0FE40FCC8B53}" srcOrd="0" destOrd="0" presId="urn:microsoft.com/office/officeart/2005/8/layout/process1"/>
-    <dgm:cxn modelId="{2152B903-6CC5-2440-BA20-326126916741}" type="presOf" srcId="{155BAB72-91A2-B24F-ABA5-BBAFDE810DCA}" destId="{D4DDD540-ED48-5942-AA78-D01D2ECBD96B}" srcOrd="0" destOrd="0" presId="urn:microsoft.com/office/officeart/2005/8/layout/process1"/>
-    <dgm:cxn modelId="{FEB9A55B-FAC7-9B42-B99D-615155408B39}" type="presOf" srcId="{861B8FD1-DECA-1E48-8FC2-4510D62D5AF5}" destId="{B8A9E1DD-42F9-8A4E-BB27-9F6E19AEE73D}" srcOrd="0" destOrd="0" presId="urn:microsoft.com/office/officeart/2005/8/layout/process1"/>
-    <dgm:cxn modelId="{AA5F4730-2A27-BD4E-9A6F-9A356B11A8D7}" srcId="{C18830F0-300D-5A4E-9133-47129AC70423}" destId="{2E6B767F-3AAD-6A48-9738-0F8563A80CF1}" srcOrd="4" destOrd="0" parTransId="{272E3249-1E6F-F14A-A93A-B99C62A3424F}" sibTransId="{0C2BE505-C5FD-E646-BB0B-BAAACC080997}"/>
-    <dgm:cxn modelId="{B1540A68-6274-4E40-98D1-4AF664F6C3FC}" type="presOf" srcId="{794EC41E-1CFC-AA4A-95F9-F0577CD5B8DF}" destId="{0FB689FA-F4EF-C54A-8D17-15AC9E2DA91E}" srcOrd="0" destOrd="0" presId="urn:microsoft.com/office/officeart/2005/8/layout/process1"/>
-    <dgm:cxn modelId="{0135EEF6-C630-FB4F-9F0F-D581E47D0236}" type="presOf" srcId="{CBD7F8D0-01A1-9642-914C-3A9E699DD309}" destId="{B932EA59-50DD-424A-8986-12F79C4627C0}" srcOrd="0" destOrd="0" presId="urn:microsoft.com/office/officeart/2005/8/layout/process1"/>
     <dgm:cxn modelId="{01B0FF07-1A5A-B44D-AF7F-4B2E183A2833}" type="presOf" srcId="{794EC41E-1CFC-AA4A-95F9-F0577CD5B8DF}" destId="{2A7DFE14-643A-6F42-9471-C7E2C5C3D0F2}" srcOrd="1" destOrd="0" presId="urn:microsoft.com/office/officeart/2005/8/layout/process1"/>
     <dgm:cxn modelId="{635D99EE-8E83-E24D-BBCC-0E4FACD7ADC6}" srcId="{C18830F0-300D-5A4E-9133-47129AC70423}" destId="{8AE3F35F-6329-CB4C-B927-14C263065096}" srcOrd="3" destOrd="0" parTransId="{4D213F1F-2B23-E942-A912-7FC8BC56F4A4}" sibTransId="{A9A8AC24-369C-F44C-904B-77A0335B6680}"/>
-    <dgm:cxn modelId="{5E1CB6C4-FD00-304C-BEB3-4F403C3B1A6F}" type="presOf" srcId="{21AFD040-B0C9-D74E-AA77-F578510CD899}" destId="{02169A15-8F44-0F4E-8E62-3B6BA9F6FF93}" srcOrd="0" destOrd="0" presId="urn:microsoft.com/office/officeart/2005/8/layout/process1"/>
+    <dgm:cxn modelId="{0B863C5A-1079-254B-9F58-D0475CD7B82C}" type="presOf" srcId="{483FB463-73C5-0748-81E5-F17B8F8CCAF4}" destId="{D4923FF6-6C56-6D4D-8872-C2ECD422D5AD}" srcOrd="0" destOrd="0" presId="urn:microsoft.com/office/officeart/2005/8/layout/process1"/>
+    <dgm:cxn modelId="{367A6384-BB68-6041-BCFD-1210A0F43B1F}" type="presOf" srcId="{21AFD040-B0C9-D74E-AA77-F578510CD899}" destId="{6510D54C-8403-AC47-B183-03EA583C71F8}" srcOrd="1" destOrd="0" presId="urn:microsoft.com/office/officeart/2005/8/layout/process1"/>
+    <dgm:cxn modelId="{B1540A68-6274-4E40-98D1-4AF664F6C3FC}" type="presOf" srcId="{794EC41E-1CFC-AA4A-95F9-F0577CD5B8DF}" destId="{0FB689FA-F4EF-C54A-8D17-15AC9E2DA91E}" srcOrd="0" destOrd="0" presId="urn:microsoft.com/office/officeart/2005/8/layout/process1"/>
+    <dgm:cxn modelId="{2152B903-6CC5-2440-BA20-326126916741}" type="presOf" srcId="{155BAB72-91A2-B24F-ABA5-BBAFDE810DCA}" destId="{D4DDD540-ED48-5942-AA78-D01D2ECBD96B}" srcOrd="0" destOrd="0" presId="urn:microsoft.com/office/officeart/2005/8/layout/process1"/>
+    <dgm:cxn modelId="{AE807857-4629-7D43-A092-351D6EF90E88}" type="presOf" srcId="{155BAB72-91A2-B24F-ABA5-BBAFDE810DCA}" destId="{F61B26C2-BF9F-4C47-8753-E78FA6B4E8D2}" srcOrd="1" destOrd="0" presId="urn:microsoft.com/office/officeart/2005/8/layout/process1"/>
     <dgm:cxn modelId="{48259DE3-6B72-5443-AB95-0083E9C3F330}" type="presParOf" srcId="{9A1A1469-D0F9-B54A-BBF4-0FE40FCC8B53}" destId="{D4923FF6-6C56-6D4D-8872-C2ECD422D5AD}" srcOrd="0" destOrd="0" presId="urn:microsoft.com/office/officeart/2005/8/layout/process1"/>
     <dgm:cxn modelId="{846A05E9-F46E-1F40-9839-40BD7F9D3290}" type="presParOf" srcId="{9A1A1469-D0F9-B54A-BBF4-0FE40FCC8B53}" destId="{D4DDD540-ED48-5942-AA78-D01D2ECBD96B}" srcOrd="1" destOrd="0" presId="urn:microsoft.com/office/officeart/2005/8/layout/process1"/>
     <dgm:cxn modelId="{2F6A1B9E-9152-1949-A7B6-04C27A48D460}" type="presParOf" srcId="{D4DDD540-ED48-5942-AA78-D01D2ECBD96B}" destId="{F61B26C2-BF9F-4C47-8753-E78FA6B4E8D2}" srcOrd="0" destOrd="0" presId="urn:microsoft.com/office/officeart/2005/8/layout/process1"/>
@@ -3669,7 +3765,7 @@
           <a:p>
             <a:fld id="{796DB765-2ECA-424B-9D71-98DE5D0A9EA4}" type="datetimeFigureOut">
               <a:rPr lang="en-US" smtClean="0"/>
-              <a:t>11/28/16</a:t>
+              <a:t>11/29/16</a:t>
             </a:fld>
             <a:endParaRPr lang="en-US"/>
           </a:p>
@@ -3839,7 +3935,7 @@
           <a:p>
             <a:fld id="{796DB765-2ECA-424B-9D71-98DE5D0A9EA4}" type="datetimeFigureOut">
               <a:rPr lang="en-US" smtClean="0"/>
-              <a:t>11/28/16</a:t>
+              <a:t>11/29/16</a:t>
             </a:fld>
             <a:endParaRPr lang="en-US"/>
           </a:p>
@@ -4019,7 +4115,7 @@
           <a:p>
             <a:fld id="{796DB765-2ECA-424B-9D71-98DE5D0A9EA4}" type="datetimeFigureOut">
               <a:rPr lang="en-US" smtClean="0"/>
-              <a:t>11/28/16</a:t>
+              <a:t>11/29/16</a:t>
             </a:fld>
             <a:endParaRPr lang="en-US"/>
           </a:p>
@@ -4189,7 +4285,7 @@
           <a:p>
             <a:fld id="{796DB765-2ECA-424B-9D71-98DE5D0A9EA4}" type="datetimeFigureOut">
               <a:rPr lang="en-US" smtClean="0"/>
-              <a:t>11/28/16</a:t>
+              <a:t>11/29/16</a:t>
             </a:fld>
             <a:endParaRPr lang="en-US"/>
           </a:p>
@@ -4435,7 +4531,7 @@
           <a:p>
             <a:fld id="{796DB765-2ECA-424B-9D71-98DE5D0A9EA4}" type="datetimeFigureOut">
               <a:rPr lang="en-US" smtClean="0"/>
-              <a:t>11/28/16</a:t>
+              <a:t>11/29/16</a:t>
             </a:fld>
             <a:endParaRPr lang="en-US"/>
           </a:p>
@@ -4667,7 +4763,7 @@
           <a:p>
             <a:fld id="{796DB765-2ECA-424B-9D71-98DE5D0A9EA4}" type="datetimeFigureOut">
               <a:rPr lang="en-US" smtClean="0"/>
-              <a:t>11/28/16</a:t>
+              <a:t>11/29/16</a:t>
             </a:fld>
             <a:endParaRPr lang="en-US"/>
           </a:p>
@@ -5034,7 +5130,7 @@
           <a:p>
             <a:fld id="{796DB765-2ECA-424B-9D71-98DE5D0A9EA4}" type="datetimeFigureOut">
               <a:rPr lang="en-US" smtClean="0"/>
-              <a:t>11/28/16</a:t>
+              <a:t>11/29/16</a:t>
             </a:fld>
             <a:endParaRPr lang="en-US"/>
           </a:p>
@@ -5152,7 +5248,7 @@
           <a:p>
             <a:fld id="{796DB765-2ECA-424B-9D71-98DE5D0A9EA4}" type="datetimeFigureOut">
               <a:rPr lang="en-US" smtClean="0"/>
-              <a:t>11/28/16</a:t>
+              <a:t>11/29/16</a:t>
             </a:fld>
             <a:endParaRPr lang="en-US"/>
           </a:p>
@@ -5247,7 +5343,7 @@
           <a:p>
             <a:fld id="{796DB765-2ECA-424B-9D71-98DE5D0A9EA4}" type="datetimeFigureOut">
               <a:rPr lang="en-US" smtClean="0"/>
-              <a:t>11/28/16</a:t>
+              <a:t>11/29/16</a:t>
             </a:fld>
             <a:endParaRPr lang="en-US"/>
           </a:p>
@@ -5524,7 +5620,7 @@
           <a:p>
             <a:fld id="{796DB765-2ECA-424B-9D71-98DE5D0A9EA4}" type="datetimeFigureOut">
               <a:rPr lang="en-US" smtClean="0"/>
-              <a:t>11/28/16</a:t>
+              <a:t>11/29/16</a:t>
             </a:fld>
             <a:endParaRPr lang="en-US"/>
           </a:p>
@@ -5777,7 +5873,7 @@
           <a:p>
             <a:fld id="{796DB765-2ECA-424B-9D71-98DE5D0A9EA4}" type="datetimeFigureOut">
               <a:rPr lang="en-US" smtClean="0"/>
-              <a:t>11/28/16</a:t>
+              <a:t>11/29/16</a:t>
             </a:fld>
             <a:endParaRPr lang="en-US"/>
           </a:p>
@@ -5990,7 +6086,7 @@
           <a:p>
             <a:fld id="{796DB765-2ECA-424B-9D71-98DE5D0A9EA4}" type="datetimeFigureOut">
               <a:rPr lang="en-US" smtClean="0"/>
-              <a:t>11/28/16</a:t>
+              <a:t>11/29/16</a:t>
             </a:fld>
             <a:endParaRPr lang="en-US"/>
           </a:p>
@@ -6447,39 +6543,6 @@
           </a:p>
         </p:txBody>
       </p:sp>
-      <p:cxnSp>
-        <p:nvCxnSpPr>
-          <p:cNvPr id="9" name="Straight Arrow Connector 8"/>
-          <p:cNvCxnSpPr/>
-          <p:nvPr/>
-        </p:nvCxnSpPr>
-        <p:spPr>
-          <a:xfrm flipV="1">
-            <a:off x="2235200" y="1659468"/>
-            <a:ext cx="169333" cy="618065"/>
-          </a:xfrm>
-          <a:prstGeom prst="straightConnector1">
-            <a:avLst/>
-          </a:prstGeom>
-          <a:ln>
-            <a:tailEnd type="triangle"/>
-          </a:ln>
-        </p:spPr>
-        <p:style>
-          <a:lnRef idx="1">
-            <a:schemeClr val="accent1"/>
-          </a:lnRef>
-          <a:fillRef idx="0">
-            <a:schemeClr val="accent1"/>
-          </a:fillRef>
-          <a:effectRef idx="0">
-            <a:schemeClr val="accent1"/>
-          </a:effectRef>
-          <a:fontRef idx="minor">
-            <a:schemeClr val="tx1"/>
-          </a:fontRef>
-        </p:style>
-      </p:cxnSp>
       <p:grpSp>
         <p:nvGrpSpPr>
           <p:cNvPr id="10" name="Group 9"/>
@@ -6603,39 +6666,6 @@
           </p:txBody>
         </p:sp>
       </p:grpSp>
-      <p:cxnSp>
-        <p:nvCxnSpPr>
-          <p:cNvPr id="14" name="Straight Arrow Connector 13"/>
-          <p:cNvCxnSpPr/>
-          <p:nvPr/>
-        </p:nvCxnSpPr>
-        <p:spPr>
-          <a:xfrm flipH="1">
-            <a:off x="4157095" y="1702091"/>
-            <a:ext cx="80818" cy="615560"/>
-          </a:xfrm>
-          <a:prstGeom prst="straightConnector1">
-            <a:avLst/>
-          </a:prstGeom>
-          <a:ln>
-            <a:tailEnd type="triangle"/>
-          </a:ln>
-        </p:spPr>
-        <p:style>
-          <a:lnRef idx="1">
-            <a:schemeClr val="accent1"/>
-          </a:lnRef>
-          <a:fillRef idx="0">
-            <a:schemeClr val="accent1"/>
-          </a:fillRef>
-          <a:effectRef idx="0">
-            <a:schemeClr val="accent1"/>
-          </a:effectRef>
-          <a:fontRef idx="minor">
-            <a:schemeClr val="tx1"/>
-          </a:fontRef>
-        </p:style>
-      </p:cxnSp>
       <p:sp>
         <p:nvSpPr>
           <p:cNvPr id="15" name="TextBox 14"/>
@@ -6730,39 +6760,6 @@
           </a:p>
         </p:txBody>
       </p:sp>
-      <p:cxnSp>
-        <p:nvCxnSpPr>
-          <p:cNvPr id="26" name="Straight Arrow Connector 25"/>
-          <p:cNvCxnSpPr/>
-          <p:nvPr/>
-        </p:nvCxnSpPr>
-        <p:spPr>
-          <a:xfrm>
-            <a:off x="4720148" y="3796266"/>
-            <a:ext cx="16933" cy="1605465"/>
-          </a:xfrm>
-          <a:prstGeom prst="straightConnector1">
-            <a:avLst/>
-          </a:prstGeom>
-          <a:ln>
-            <a:tailEnd type="triangle"/>
-          </a:ln>
-        </p:spPr>
-        <p:style>
-          <a:lnRef idx="1">
-            <a:schemeClr val="accent1"/>
-          </a:lnRef>
-          <a:fillRef idx="0">
-            <a:schemeClr val="accent1"/>
-          </a:fillRef>
-          <a:effectRef idx="0">
-            <a:schemeClr val="accent1"/>
-          </a:effectRef>
-          <a:fontRef idx="minor">
-            <a:schemeClr val="tx1"/>
-          </a:fontRef>
-        </p:style>
-      </p:cxnSp>
       <p:sp>
         <p:nvSpPr>
           <p:cNvPr id="27" name="TextBox 26"/>
@@ -6832,105 +6829,6 @@
           </a:p>
         </p:txBody>
       </p:sp>
-      <p:cxnSp>
-        <p:nvCxnSpPr>
-          <p:cNvPr id="35" name="Straight Arrow Connector 34"/>
-          <p:cNvCxnSpPr/>
-          <p:nvPr/>
-        </p:nvCxnSpPr>
-        <p:spPr>
-          <a:xfrm>
-            <a:off x="9016962" y="1591901"/>
-            <a:ext cx="16933" cy="1605465"/>
-          </a:xfrm>
-          <a:prstGeom prst="straightConnector1">
-            <a:avLst/>
-          </a:prstGeom>
-          <a:ln>
-            <a:tailEnd type="triangle"/>
-          </a:ln>
-        </p:spPr>
-        <p:style>
-          <a:lnRef idx="1">
-            <a:schemeClr val="accent1"/>
-          </a:lnRef>
-          <a:fillRef idx="0">
-            <a:schemeClr val="accent1"/>
-          </a:fillRef>
-          <a:effectRef idx="0">
-            <a:schemeClr val="accent1"/>
-          </a:effectRef>
-          <a:fontRef idx="minor">
-            <a:schemeClr val="tx1"/>
-          </a:fontRef>
-        </p:style>
-      </p:cxnSp>
-      <p:cxnSp>
-        <p:nvCxnSpPr>
-          <p:cNvPr id="36" name="Straight Arrow Connector 35"/>
-          <p:cNvCxnSpPr/>
-          <p:nvPr/>
-        </p:nvCxnSpPr>
-        <p:spPr>
-          <a:xfrm>
-            <a:off x="2624667" y="3796266"/>
-            <a:ext cx="16933" cy="1605465"/>
-          </a:xfrm>
-          <a:prstGeom prst="straightConnector1">
-            <a:avLst/>
-          </a:prstGeom>
-          <a:ln>
-            <a:tailEnd type="triangle"/>
-          </a:ln>
-        </p:spPr>
-        <p:style>
-          <a:lnRef idx="1">
-            <a:schemeClr val="accent1"/>
-          </a:lnRef>
-          <a:fillRef idx="0">
-            <a:schemeClr val="accent1"/>
-          </a:fillRef>
-          <a:effectRef idx="0">
-            <a:schemeClr val="accent1"/>
-          </a:effectRef>
-          <a:fontRef idx="minor">
-            <a:schemeClr val="tx1"/>
-          </a:fontRef>
-        </p:style>
-      </p:cxnSp>
-      <p:cxnSp>
-        <p:nvCxnSpPr>
-          <p:cNvPr id="37" name="Straight Arrow Connector 36"/>
-          <p:cNvCxnSpPr/>
-          <p:nvPr/>
-        </p:nvCxnSpPr>
-        <p:spPr>
-          <a:xfrm>
-            <a:off x="6921481" y="3796265"/>
-            <a:ext cx="16933" cy="1605465"/>
-          </a:xfrm>
-          <a:prstGeom prst="straightConnector1">
-            <a:avLst/>
-          </a:prstGeom>
-          <a:ln>
-            <a:tailEnd type="triangle"/>
-          </a:ln>
-        </p:spPr>
-        <p:style>
-          <a:lnRef idx="1">
-            <a:schemeClr val="accent1"/>
-          </a:lnRef>
-          <a:fillRef idx="0">
-            <a:schemeClr val="accent1"/>
-          </a:fillRef>
-          <a:effectRef idx="0">
-            <a:schemeClr val="accent1"/>
-          </a:effectRef>
-          <a:fontRef idx="minor">
-            <a:schemeClr val="tx1"/>
-          </a:fontRef>
-        </p:style>
-      </p:cxnSp>
       <p:sp>
         <p:nvSpPr>
           <p:cNvPr id="38" name="TextBox 37"/>
@@ -6992,6 +6890,246 @@
               <a:t>Target Includes predictions</a:t>
             </a:r>
             <a:endParaRPr lang="en-US" b="1" dirty="0"/>
+          </a:p>
+        </p:txBody>
+      </p:sp>
+      <p:sp>
+        <p:nvSpPr>
+          <p:cNvPr id="2" name="Right Arrow 1"/>
+          <p:cNvSpPr/>
+          <p:nvPr/>
+        </p:nvSpPr>
+        <p:spPr>
+          <a:xfrm rot="17372137">
+            <a:off x="2032145" y="1834239"/>
+            <a:ext cx="664449" cy="348447"/>
+          </a:xfrm>
+          <a:prstGeom prst="rightArrow">
+            <a:avLst/>
+          </a:prstGeom>
+        </p:spPr>
+        <p:style>
+          <a:lnRef idx="2">
+            <a:schemeClr val="accent1">
+              <a:shade val="50000"/>
+            </a:schemeClr>
+          </a:lnRef>
+          <a:fillRef idx="1">
+            <a:schemeClr val="accent1"/>
+          </a:fillRef>
+          <a:effectRef idx="0">
+            <a:schemeClr val="accent1"/>
+          </a:effectRef>
+          <a:fontRef idx="minor">
+            <a:schemeClr val="lt1"/>
+          </a:fontRef>
+        </p:style>
+        <p:txBody>
+          <a:bodyPr rtlCol="0" anchor="ctr"/>
+          <a:lstStyle/>
+          <a:p>
+            <a:pPr algn="ctr"/>
+            <a:endParaRPr lang="en-US"/>
+          </a:p>
+        </p:txBody>
+      </p:sp>
+      <p:sp>
+        <p:nvSpPr>
+          <p:cNvPr id="20" name="Right Arrow 19"/>
+          <p:cNvSpPr/>
+          <p:nvPr/>
+        </p:nvSpPr>
+        <p:spPr>
+          <a:xfrm rot="6533574">
+            <a:off x="4028702" y="1864535"/>
+            <a:ext cx="675244" cy="384086"/>
+          </a:xfrm>
+          <a:prstGeom prst="rightArrow">
+            <a:avLst/>
+          </a:prstGeom>
+        </p:spPr>
+        <p:style>
+          <a:lnRef idx="2">
+            <a:schemeClr val="accent1">
+              <a:shade val="50000"/>
+            </a:schemeClr>
+          </a:lnRef>
+          <a:fillRef idx="1">
+            <a:schemeClr val="accent1"/>
+          </a:fillRef>
+          <a:effectRef idx="0">
+            <a:schemeClr val="accent1"/>
+          </a:effectRef>
+          <a:fontRef idx="minor">
+            <a:schemeClr val="lt1"/>
+          </a:fontRef>
+        </p:style>
+        <p:txBody>
+          <a:bodyPr rtlCol="0" anchor="ctr"/>
+          <a:lstStyle/>
+          <a:p>
+            <a:pPr algn="ctr"/>
+            <a:endParaRPr lang="en-US"/>
+          </a:p>
+        </p:txBody>
+      </p:sp>
+      <p:sp>
+        <p:nvSpPr>
+          <p:cNvPr id="21" name="Right Arrow 20"/>
+          <p:cNvSpPr/>
+          <p:nvPr/>
+        </p:nvSpPr>
+        <p:spPr>
+          <a:xfrm rot="5400000">
+            <a:off x="1858779" y="4515597"/>
+            <a:ext cx="1561758" cy="243054"/>
+          </a:xfrm>
+          <a:prstGeom prst="rightArrow">
+            <a:avLst/>
+          </a:prstGeom>
+        </p:spPr>
+        <p:style>
+          <a:lnRef idx="2">
+            <a:schemeClr val="accent1">
+              <a:shade val="50000"/>
+            </a:schemeClr>
+          </a:lnRef>
+          <a:fillRef idx="1">
+            <a:schemeClr val="accent1"/>
+          </a:fillRef>
+          <a:effectRef idx="0">
+            <a:schemeClr val="accent1"/>
+          </a:effectRef>
+          <a:fontRef idx="minor">
+            <a:schemeClr val="lt1"/>
+          </a:fontRef>
+        </p:style>
+        <p:txBody>
+          <a:bodyPr rtlCol="0" anchor="ctr"/>
+          <a:lstStyle/>
+          <a:p>
+            <a:pPr algn="ctr"/>
+            <a:endParaRPr lang="en-US"/>
+          </a:p>
+        </p:txBody>
+      </p:sp>
+      <p:sp>
+        <p:nvSpPr>
+          <p:cNvPr id="22" name="Right Arrow 21"/>
+          <p:cNvSpPr/>
+          <p:nvPr/>
+        </p:nvSpPr>
+        <p:spPr>
+          <a:xfrm rot="5400000">
+            <a:off x="3956202" y="4421532"/>
+            <a:ext cx="1561758" cy="243054"/>
+          </a:xfrm>
+          <a:prstGeom prst="rightArrow">
+            <a:avLst/>
+          </a:prstGeom>
+        </p:spPr>
+        <p:style>
+          <a:lnRef idx="2">
+            <a:schemeClr val="accent1">
+              <a:shade val="50000"/>
+            </a:schemeClr>
+          </a:lnRef>
+          <a:fillRef idx="1">
+            <a:schemeClr val="accent1"/>
+          </a:fillRef>
+          <a:effectRef idx="0">
+            <a:schemeClr val="accent1"/>
+          </a:effectRef>
+          <a:fontRef idx="minor">
+            <a:schemeClr val="lt1"/>
+          </a:fontRef>
+        </p:style>
+        <p:txBody>
+          <a:bodyPr rtlCol="0" anchor="ctr"/>
+          <a:lstStyle/>
+          <a:p>
+            <a:pPr algn="ctr"/>
+            <a:endParaRPr lang="en-US"/>
+          </a:p>
+        </p:txBody>
+      </p:sp>
+      <p:sp>
+        <p:nvSpPr>
+          <p:cNvPr id="23" name="Right Arrow 22"/>
+          <p:cNvSpPr/>
+          <p:nvPr/>
+        </p:nvSpPr>
+        <p:spPr>
+          <a:xfrm rot="5400000">
+            <a:off x="6161010" y="4407678"/>
+            <a:ext cx="1561758" cy="243054"/>
+          </a:xfrm>
+          <a:prstGeom prst="rightArrow">
+            <a:avLst/>
+          </a:prstGeom>
+        </p:spPr>
+        <p:style>
+          <a:lnRef idx="2">
+            <a:schemeClr val="accent1">
+              <a:shade val="50000"/>
+            </a:schemeClr>
+          </a:lnRef>
+          <a:fillRef idx="1">
+            <a:schemeClr val="accent1"/>
+          </a:fillRef>
+          <a:effectRef idx="0">
+            <a:schemeClr val="accent1"/>
+          </a:effectRef>
+          <a:fontRef idx="minor">
+            <a:schemeClr val="lt1"/>
+          </a:fontRef>
+        </p:style>
+        <p:txBody>
+          <a:bodyPr rtlCol="0" anchor="ctr"/>
+          <a:lstStyle/>
+          <a:p>
+            <a:pPr algn="ctr"/>
+            <a:endParaRPr lang="en-US"/>
+          </a:p>
+        </p:txBody>
+      </p:sp>
+      <p:sp>
+        <p:nvSpPr>
+          <p:cNvPr id="24" name="Right Arrow 23"/>
+          <p:cNvSpPr/>
+          <p:nvPr/>
+        </p:nvSpPr>
+        <p:spPr>
+          <a:xfrm rot="16200000">
+            <a:off x="8233127" y="2088441"/>
+            <a:ext cx="1561758" cy="243054"/>
+          </a:xfrm>
+          <a:prstGeom prst="rightArrow">
+            <a:avLst/>
+          </a:prstGeom>
+        </p:spPr>
+        <p:style>
+          <a:lnRef idx="2">
+            <a:schemeClr val="accent1">
+              <a:shade val="50000"/>
+            </a:schemeClr>
+          </a:lnRef>
+          <a:fillRef idx="1">
+            <a:schemeClr val="accent1"/>
+          </a:fillRef>
+          <a:effectRef idx="0">
+            <a:schemeClr val="accent1"/>
+          </a:effectRef>
+          <a:fontRef idx="minor">
+            <a:schemeClr val="lt1"/>
+          </a:fontRef>
+        </p:style>
+        <p:txBody>
+          <a:bodyPr rtlCol="0" anchor="ctr"/>
+          <a:lstStyle/>
+          <a:p>
+            <a:pPr algn="ctr"/>
+            <a:endParaRPr lang="en-US"/>
           </a:p>
         </p:txBody>
       </p:sp>

</xml_diff>